<commit_message>
Don't print training process.
</commit_message>
<xml_diff>
--- a/document.pptx
+++ b/document.pptx
@@ -157,7 +157,7 @@
           <a:p>
             <a:fld id="{5BBEAD13-0566-4C6C-97E7-55F17F24B09F}" type="datetimeFigureOut">
               <a:rPr lang="zh-TW" altLang="en-US" smtClean="0"/>
-              <a:t>2020/7/12</a:t>
+              <a:t>2020/12/1</a:t>
             </a:fld>
             <a:endParaRPr lang="zh-TW" altLang="en-US"/>
           </a:p>
@@ -270,7 +270,7 @@
           <a:p>
             <a:fld id="{5BBEAD13-0566-4C6C-97E7-55F17F24B09F}" type="datetimeFigureOut">
               <a:rPr lang="zh-TW" altLang="en-US" smtClean="0"/>
-              <a:t>2020/7/12</a:t>
+              <a:t>2020/12/1</a:t>
             </a:fld>
             <a:endParaRPr lang="zh-TW" altLang="en-US"/>
           </a:p>

</xml_diff>